<commit_message>
new adv examples, presentation changes
</commit_message>
<xml_diff>
--- a/Dokumentacija/Algoritmi za brzo učenje na neprijateljskim primjerima.pptx
+++ b/Dokumentacija/Algoritmi za brzo učenje na neprijateljskim primjerima.pptx
@@ -5,7 +5,7 @@
     <p:sldMasterId id="2147483833" r:id="rId1"/>
   </p:sldMasterIdLst>
   <p:notesMasterIdLst>
-    <p:notesMasterId r:id="rId18"/>
+    <p:notesMasterId r:id="rId19"/>
   </p:notesMasterIdLst>
   <p:sldIdLst>
     <p:sldId id="256" r:id="rId2"/>
@@ -23,7 +23,8 @@
     <p:sldId id="265" r:id="rId14"/>
     <p:sldId id="267" r:id="rId15"/>
     <p:sldId id="269" r:id="rId16"/>
-    <p:sldId id="273" r:id="rId17"/>
+    <p:sldId id="274" r:id="rId17"/>
+    <p:sldId id="273" r:id="rId18"/>
   </p:sldIdLst>
   <p:sldSz cx="12192000" cy="6858000"/>
   <p:notesSz cx="6858000" cy="9144000"/>
@@ -130,12 +131,20 @@
 </p:presentation>
 </file>
 
+<file path=ppt/revisionInfo.xml><?xml version="1.0" encoding="utf-8"?>
+<p1510:revInfo xmlns:a="http://schemas.openxmlformats.org/drawingml/2006/main" xmlns:r="http://schemas.openxmlformats.org/officeDocument/2006/relationships" xmlns:p1510="http://schemas.microsoft.com/office/powerpoint/2015/10/main">
+  <p1510:revLst>
+    <p1510:client id="{AECD7580-AEB0-4A32-AFC5-21E70B1FC397}" v="13" dt="2023-07-05T12:42:00.186"/>
+  </p1510:revLst>
+</p1510:revInfo>
+</file>
+
 <file path=ppt/changesInfos/changesInfo1.xml><?xml version="1.0" encoding="utf-8"?>
 <pc:chgInfo xmlns:a="http://schemas.openxmlformats.org/drawingml/2006/main" xmlns:r="http://schemas.openxmlformats.org/officeDocument/2006/relationships" xmlns:ac="http://schemas.microsoft.com/office/drawing/2013/main/command" xmlns:pc="http://schemas.microsoft.com/office/powerpoint/2013/main/command">
   <pc:docChgLst>
     <pc:chgData name="Dominik Jambrovic" userId="d5e0a75ae2920be5" providerId="LiveId" clId="{AECD7580-AEB0-4A32-AFC5-21E70B1FC397}"/>
-    <pc:docChg chg="custSel addSld delSld modSld sldOrd">
-      <pc:chgData name="Dominik Jambrovic" userId="d5e0a75ae2920be5" providerId="LiveId" clId="{AECD7580-AEB0-4A32-AFC5-21E70B1FC397}" dt="2023-07-03T17:37:35.145" v="433"/>
+    <pc:docChg chg="undo custSel addSld delSld modSld sldOrd">
+      <pc:chgData name="Dominik Jambrovic" userId="d5e0a75ae2920be5" providerId="LiveId" clId="{AECD7580-AEB0-4A32-AFC5-21E70B1FC397}" dt="2023-07-05T13:04:15.804" v="1460" actId="20577"/>
       <pc:docMkLst>
         <pc:docMk/>
       </pc:docMkLst>
@@ -147,7 +156,7 @@
         </pc:sldMkLst>
       </pc:sldChg>
       <pc:sldChg chg="modSp mod">
-        <pc:chgData name="Dominik Jambrovic" userId="d5e0a75ae2920be5" providerId="LiveId" clId="{AECD7580-AEB0-4A32-AFC5-21E70B1FC397}" dt="2023-07-03T17:07:02.545" v="125" actId="5793"/>
+        <pc:chgData name="Dominik Jambrovic" userId="d5e0a75ae2920be5" providerId="LiveId" clId="{AECD7580-AEB0-4A32-AFC5-21E70B1FC397}" dt="2023-07-05T11:59:46.876" v="454" actId="20577"/>
         <pc:sldMkLst>
           <pc:docMk/>
           <pc:sldMk cId="1192952942" sldId="258"/>
@@ -161,7 +170,7 @@
           </ac:spMkLst>
         </pc:spChg>
         <pc:spChg chg="mod">
-          <ac:chgData name="Dominik Jambrovic" userId="d5e0a75ae2920be5" providerId="LiveId" clId="{AECD7580-AEB0-4A32-AFC5-21E70B1FC397}" dt="2023-07-03T17:07:02.545" v="125" actId="5793"/>
+          <ac:chgData name="Dominik Jambrovic" userId="d5e0a75ae2920be5" providerId="LiveId" clId="{AECD7580-AEB0-4A32-AFC5-21E70B1FC397}" dt="2023-07-05T11:59:46.876" v="454" actId="20577"/>
           <ac:spMkLst>
             <pc:docMk/>
             <pc:sldMk cId="1192952942" sldId="258"/>
@@ -170,13 +179,13 @@
         </pc:spChg>
       </pc:sldChg>
       <pc:sldChg chg="modSp mod">
-        <pc:chgData name="Dominik Jambrovic" userId="d5e0a75ae2920be5" providerId="LiveId" clId="{AECD7580-AEB0-4A32-AFC5-21E70B1FC397}" dt="2023-07-03T00:19:44.599" v="5" actId="20577"/>
+        <pc:chgData name="Dominik Jambrovic" userId="d5e0a75ae2920be5" providerId="LiveId" clId="{AECD7580-AEB0-4A32-AFC5-21E70B1FC397}" dt="2023-07-05T12:02:53.500" v="574" actId="20577"/>
         <pc:sldMkLst>
           <pc:docMk/>
           <pc:sldMk cId="2309423491" sldId="259"/>
         </pc:sldMkLst>
         <pc:spChg chg="mod">
-          <ac:chgData name="Dominik Jambrovic" userId="d5e0a75ae2920be5" providerId="LiveId" clId="{AECD7580-AEB0-4A32-AFC5-21E70B1FC397}" dt="2023-07-03T00:19:44.599" v="5" actId="20577"/>
+          <ac:chgData name="Dominik Jambrovic" userId="d5e0a75ae2920be5" providerId="LiveId" clId="{AECD7580-AEB0-4A32-AFC5-21E70B1FC397}" dt="2023-07-05T12:02:53.500" v="574" actId="20577"/>
           <ac:spMkLst>
             <pc:docMk/>
             <pc:sldMk cId="2309423491" sldId="259"/>
@@ -199,14 +208,173 @@
           </ac:spMkLst>
         </pc:spChg>
       </pc:sldChg>
+      <pc:sldChg chg="addSp delSp modSp mod">
+        <pc:chgData name="Dominik Jambrovic" userId="d5e0a75ae2920be5" providerId="LiveId" clId="{AECD7580-AEB0-4A32-AFC5-21E70B1FC397}" dt="2023-07-05T12:43:48.627" v="675" actId="1076"/>
+        <pc:sldMkLst>
+          <pc:docMk/>
+          <pc:sldMk cId="4178081820" sldId="263"/>
+        </pc:sldMkLst>
+        <pc:spChg chg="add del mod">
+          <ac:chgData name="Dominik Jambrovic" userId="d5e0a75ae2920be5" providerId="LiveId" clId="{AECD7580-AEB0-4A32-AFC5-21E70B1FC397}" dt="2023-07-05T12:06:30.036" v="578" actId="931"/>
+          <ac:spMkLst>
+            <pc:docMk/>
+            <pc:sldMk cId="4178081820" sldId="263"/>
+            <ac:spMk id="5" creationId="{E492A989-62A7-4371-232C-5E7E5A6C283D}"/>
+          </ac:spMkLst>
+        </pc:spChg>
+        <pc:spChg chg="add del">
+          <ac:chgData name="Dominik Jambrovic" userId="d5e0a75ae2920be5" providerId="LiveId" clId="{AECD7580-AEB0-4A32-AFC5-21E70B1FC397}" dt="2023-07-05T12:06:13.169" v="577" actId="478"/>
+          <ac:spMkLst>
+            <pc:docMk/>
+            <pc:sldMk cId="4178081820" sldId="263"/>
+            <ac:spMk id="7" creationId="{6DDB55D1-E3DB-B633-8414-410A6B892743}"/>
+          </ac:spMkLst>
+        </pc:spChg>
+        <pc:spChg chg="add del mod">
+          <ac:chgData name="Dominik Jambrovic" userId="d5e0a75ae2920be5" providerId="LiveId" clId="{AECD7580-AEB0-4A32-AFC5-21E70B1FC397}" dt="2023-07-05T12:35:13.968" v="627" actId="931"/>
+          <ac:spMkLst>
+            <pc:docMk/>
+            <pc:sldMk cId="4178081820" sldId="263"/>
+            <ac:spMk id="7" creationId="{A73CA05F-521D-CB4E-610C-6769ED63D5A3}"/>
+          </ac:spMkLst>
+        </pc:spChg>
+        <pc:spChg chg="add del mod">
+          <ac:chgData name="Dominik Jambrovic" userId="d5e0a75ae2920be5" providerId="LiveId" clId="{AECD7580-AEB0-4A32-AFC5-21E70B1FC397}" dt="2023-07-05T12:40:07.357" v="661" actId="931"/>
+          <ac:spMkLst>
+            <pc:docMk/>
+            <pc:sldMk cId="4178081820" sldId="263"/>
+            <ac:spMk id="12" creationId="{0B8213B7-CD32-8459-3AF0-08774DFF8525}"/>
+          </ac:spMkLst>
+        </pc:spChg>
+        <pc:spChg chg="add del mod">
+          <ac:chgData name="Dominik Jambrovic" userId="d5e0a75ae2920be5" providerId="LiveId" clId="{AECD7580-AEB0-4A32-AFC5-21E70B1FC397}" dt="2023-07-05T12:12:51.926" v="599" actId="931"/>
+          <ac:spMkLst>
+            <pc:docMk/>
+            <pc:sldMk cId="4178081820" sldId="263"/>
+            <ac:spMk id="13" creationId="{D29F4FB0-571F-8027-5954-D1B2E5271DAD}"/>
+          </ac:spMkLst>
+        </pc:spChg>
+        <pc:picChg chg="add del mod">
+          <ac:chgData name="Dominik Jambrovic" userId="d5e0a75ae2920be5" providerId="LiveId" clId="{AECD7580-AEB0-4A32-AFC5-21E70B1FC397}" dt="2023-07-05T12:34:41.436" v="622" actId="478"/>
+          <ac:picMkLst>
+            <pc:docMk/>
+            <pc:sldMk cId="4178081820" sldId="263"/>
+            <ac:picMk id="3" creationId="{70109599-3FEC-8BD0-ACE4-EEF9AF2A8E0F}"/>
+          </ac:picMkLst>
+        </pc:picChg>
+        <pc:picChg chg="add del mod ord">
+          <ac:chgData name="Dominik Jambrovic" userId="d5e0a75ae2920be5" providerId="LiveId" clId="{AECD7580-AEB0-4A32-AFC5-21E70B1FC397}" dt="2023-07-05T12:37:57.680" v="651" actId="478"/>
+          <ac:picMkLst>
+            <pc:docMk/>
+            <pc:sldMk cId="4178081820" sldId="263"/>
+            <ac:picMk id="5" creationId="{E5EF6BB7-0452-2D15-6BBD-4B22D5998E92}"/>
+          </ac:picMkLst>
+        </pc:picChg>
+        <pc:picChg chg="del">
+          <ac:chgData name="Dominik Jambrovic" userId="d5e0a75ae2920be5" providerId="LiveId" clId="{AECD7580-AEB0-4A32-AFC5-21E70B1FC397}" dt="2023-07-05T12:06:06.592" v="575" actId="478"/>
+          <ac:picMkLst>
+            <pc:docMk/>
+            <pc:sldMk cId="4178081820" sldId="263"/>
+            <ac:picMk id="8" creationId="{5D4F0AA5-370C-D7CE-7159-733EB6A2B632}"/>
+          </ac:picMkLst>
+        </pc:picChg>
+        <pc:picChg chg="add del mod ord modCrop">
+          <ac:chgData name="Dominik Jambrovic" userId="d5e0a75ae2920be5" providerId="LiveId" clId="{AECD7580-AEB0-4A32-AFC5-21E70B1FC397}" dt="2023-07-05T12:40:00.388" v="659" actId="478"/>
+          <ac:picMkLst>
+            <pc:docMk/>
+            <pc:sldMk cId="4178081820" sldId="263"/>
+            <ac:picMk id="9" creationId="{7F4CFFCE-BF9D-F722-CBAF-78AEE57C525D}"/>
+          </ac:picMkLst>
+        </pc:picChg>
+        <pc:picChg chg="add del mod modCrop">
+          <ac:chgData name="Dominik Jambrovic" userId="d5e0a75ae2920be5" providerId="LiveId" clId="{AECD7580-AEB0-4A32-AFC5-21E70B1FC397}" dt="2023-07-05T12:40:02.008" v="660" actId="478"/>
+          <ac:picMkLst>
+            <pc:docMk/>
+            <pc:sldMk cId="4178081820" sldId="263"/>
+            <ac:picMk id="10" creationId="{59969F76-BECB-D171-7255-7D5C3EA360EA}"/>
+          </ac:picMkLst>
+        </pc:picChg>
+        <pc:picChg chg="add del mod modCrop">
+          <ac:chgData name="Dominik Jambrovic" userId="d5e0a75ae2920be5" providerId="LiveId" clId="{AECD7580-AEB0-4A32-AFC5-21E70B1FC397}" dt="2023-07-05T12:12:42.934" v="598" actId="478"/>
+          <ac:picMkLst>
+            <pc:docMk/>
+            <pc:sldMk cId="4178081820" sldId="263"/>
+            <ac:picMk id="10" creationId="{77827D3E-B31B-6B60-6B39-7D0613743368}"/>
+          </ac:picMkLst>
+        </pc:picChg>
+        <pc:picChg chg="add del mod modCrop">
+          <ac:chgData name="Dominik Jambrovic" userId="d5e0a75ae2920be5" providerId="LiveId" clId="{AECD7580-AEB0-4A32-AFC5-21E70B1FC397}" dt="2023-07-05T12:12:55.519" v="602" actId="478"/>
+          <ac:picMkLst>
+            <pc:docMk/>
+            <pc:sldMk cId="4178081820" sldId="263"/>
+            <ac:picMk id="11" creationId="{F5A7D509-4097-E34C-06E6-4EA5370EE282}"/>
+          </ac:picMkLst>
+        </pc:picChg>
+        <pc:picChg chg="add mod modCrop">
+          <ac:chgData name="Dominik Jambrovic" userId="d5e0a75ae2920be5" providerId="LiveId" clId="{AECD7580-AEB0-4A32-AFC5-21E70B1FC397}" dt="2023-07-05T12:43:20.474" v="674" actId="732"/>
+          <ac:picMkLst>
+            <pc:docMk/>
+            <pc:sldMk cId="4178081820" sldId="263"/>
+            <ac:picMk id="14" creationId="{CF1CD59E-A0ED-7DD2-3296-828C74F40440}"/>
+          </ac:picMkLst>
+        </pc:picChg>
+        <pc:picChg chg="add del mod modCrop">
+          <ac:chgData name="Dominik Jambrovic" userId="d5e0a75ae2920be5" providerId="LiveId" clId="{AECD7580-AEB0-4A32-AFC5-21E70B1FC397}" dt="2023-07-05T12:35:02.796" v="626" actId="478"/>
+          <ac:picMkLst>
+            <pc:docMk/>
+            <pc:sldMk cId="4178081820" sldId="263"/>
+            <ac:picMk id="15" creationId="{51BA1B61-3608-FD9C-CE41-8BA5F74218FD}"/>
+          </ac:picMkLst>
+        </pc:picChg>
+        <pc:picChg chg="add del mod modCrop">
+          <ac:chgData name="Dominik Jambrovic" userId="d5e0a75ae2920be5" providerId="LiveId" clId="{AECD7580-AEB0-4A32-AFC5-21E70B1FC397}" dt="2023-07-05T12:37:46.690" v="648" actId="478"/>
+          <ac:picMkLst>
+            <pc:docMk/>
+            <pc:sldMk cId="4178081820" sldId="263"/>
+            <ac:picMk id="16" creationId="{0D1407E0-A3B3-FCE3-D9F2-98CCC7012549}"/>
+          </ac:picMkLst>
+        </pc:picChg>
+        <pc:picChg chg="add mod modCrop">
+          <ac:chgData name="Dominik Jambrovic" userId="d5e0a75ae2920be5" providerId="LiveId" clId="{AECD7580-AEB0-4A32-AFC5-21E70B1FC397}" dt="2023-07-05T12:43:48.627" v="675" actId="1076"/>
+          <ac:picMkLst>
+            <pc:docMk/>
+            <pc:sldMk cId="4178081820" sldId="263"/>
+            <ac:picMk id="17" creationId="{10838F70-707F-8DFF-C5D7-355AB068048C}"/>
+          </ac:picMkLst>
+        </pc:picChg>
+        <pc:picChg chg="add mod">
+          <ac:chgData name="Dominik Jambrovic" userId="d5e0a75ae2920be5" providerId="LiveId" clId="{AECD7580-AEB0-4A32-AFC5-21E70B1FC397}" dt="2023-07-05T12:15:36.512" v="618" actId="571"/>
+          <ac:picMkLst>
+            <pc:docMk/>
+            <pc:sldMk cId="4178081820" sldId="263"/>
+            <ac:picMk id="17" creationId="{CBA5D0EE-771D-1624-922F-56AEC47C890B}"/>
+          </ac:picMkLst>
+        </pc:picChg>
+        <pc:picChg chg="add mod">
+          <ac:chgData name="Dominik Jambrovic" userId="d5e0a75ae2920be5" providerId="LiveId" clId="{AECD7580-AEB0-4A32-AFC5-21E70B1FC397}" dt="2023-07-05T12:15:36.512" v="618" actId="571"/>
+          <ac:picMkLst>
+            <pc:docMk/>
+            <pc:sldMk cId="4178081820" sldId="263"/>
+            <ac:picMk id="18" creationId="{7501D3F9-8461-F733-DF30-9D055E20C7B3}"/>
+          </ac:picMkLst>
+        </pc:picChg>
+      </pc:sldChg>
       <pc:sldChg chg="modSp mod">
-        <pc:chgData name="Dominik Jambrovic" userId="d5e0a75ae2920be5" providerId="LiveId" clId="{AECD7580-AEB0-4A32-AFC5-21E70B1FC397}" dt="2023-07-03T00:24:30.448" v="21" actId="20577"/>
+        <pc:chgData name="Dominik Jambrovic" userId="d5e0a75ae2920be5" providerId="LiveId" clId="{AECD7580-AEB0-4A32-AFC5-21E70B1FC397}" dt="2023-07-05T13:04:15.804" v="1460" actId="20577"/>
         <pc:sldMkLst>
           <pc:docMk/>
           <pc:sldMk cId="1080773206" sldId="269"/>
         </pc:sldMkLst>
         <pc:spChg chg="mod">
-          <ac:chgData name="Dominik Jambrovic" userId="d5e0a75ae2920be5" providerId="LiveId" clId="{AECD7580-AEB0-4A32-AFC5-21E70B1FC397}" dt="2023-07-03T00:24:30.448" v="21" actId="20577"/>
+          <ac:chgData name="Dominik Jambrovic" userId="d5e0a75ae2920be5" providerId="LiveId" clId="{AECD7580-AEB0-4A32-AFC5-21E70B1FC397}" dt="2023-07-05T12:46:44.254" v="692" actId="20577"/>
+          <ac:spMkLst>
+            <pc:docMk/>
+            <pc:sldMk cId="1080773206" sldId="269"/>
+            <ac:spMk id="2" creationId="{794FE518-BF5D-2ABC-255D-9818FC837A39}"/>
+          </ac:spMkLst>
+        </pc:spChg>
+        <pc:spChg chg="mod">
+          <ac:chgData name="Dominik Jambrovic" userId="d5e0a75ae2920be5" providerId="LiveId" clId="{AECD7580-AEB0-4A32-AFC5-21E70B1FC397}" dt="2023-07-05T13:04:15.804" v="1460" actId="20577"/>
           <ac:spMkLst>
             <pc:docMk/>
             <pc:sldMk cId="1080773206" sldId="269"/>
@@ -282,6 +450,13 @@
           </ac:spMkLst>
         </pc:spChg>
       </pc:sldChg>
+      <pc:sldChg chg="add">
+        <pc:chgData name="Dominik Jambrovic" userId="d5e0a75ae2920be5" providerId="LiveId" clId="{AECD7580-AEB0-4A32-AFC5-21E70B1FC397}" dt="2023-07-05T12:46:37.542" v="676" actId="2890"/>
+        <pc:sldMkLst>
+          <pc:docMk/>
+          <pc:sldMk cId="2726378578" sldId="274"/>
+        </pc:sldMkLst>
+      </pc:sldChg>
     </pc:docChg>
   </pc:docChgLst>
 </pc:chgInfo>
@@ -369,7 +544,7 @@
           <a:p>
             <a:fld id="{801240A7-1366-4C0F-98FF-2F422F619A42}" type="datetimeFigureOut">
               <a:rPr lang="hr-HR" smtClean="0"/>
-              <a:t>3.7.2023.</a:t>
+              <a:t>5.7.2023.</a:t>
             </a:fld>
             <a:endParaRPr lang="hr-HR"/>
           </a:p>
@@ -831,7 +1006,7 @@
           <a:p>
             <a:fld id="{0F1F23FC-4593-46A0-8627-4FB4898CFE6A}" type="datetime1">
               <a:rPr lang="hr-HR" smtClean="0"/>
-              <a:t>3.7.2023.</a:t>
+              <a:t>5.7.2023.</a:t>
             </a:fld>
             <a:endParaRPr lang="hr-HR"/>
           </a:p>
@@ -1001,7 +1176,7 @@
           <a:p>
             <a:fld id="{56F918B9-EC1B-42EF-AB1E-95EA9FD610BC}" type="datetime1">
               <a:rPr lang="hr-HR" smtClean="0"/>
-              <a:t>3.7.2023.</a:t>
+              <a:t>5.7.2023.</a:t>
             </a:fld>
             <a:endParaRPr lang="hr-HR"/>
           </a:p>
@@ -1222,7 +1397,7 @@
           <a:p>
             <a:fld id="{F8AD8DD4-0AF3-4ED7-BE2E-274005469ABE}" type="datetime1">
               <a:rPr lang="hr-HR" smtClean="0"/>
-              <a:t>3.7.2023.</a:t>
+              <a:t>5.7.2023.</a:t>
             </a:fld>
             <a:endParaRPr lang="hr-HR"/>
           </a:p>
@@ -1433,7 +1608,7 @@
           <a:p>
             <a:fld id="{ACA0ACB3-5091-4E8D-88CE-5CB41D1F94E4}" type="datetime1">
               <a:rPr lang="hr-HR" smtClean="0"/>
-              <a:t>3.7.2023.</a:t>
+              <a:t>5.7.2023.</a:t>
             </a:fld>
             <a:endParaRPr lang="hr-HR"/>
           </a:p>
@@ -1728,7 +1903,7 @@
           <a:p>
             <a:fld id="{684ABAD5-E044-47F1-9C1C-22208BB38EE9}" type="datetime1">
               <a:rPr lang="hr-HR" smtClean="0"/>
-              <a:t>3.7.2023.</a:t>
+              <a:t>5.7.2023.</a:t>
             </a:fld>
             <a:endParaRPr lang="hr-HR"/>
           </a:p>
@@ -2057,7 +2232,7 @@
           <a:p>
             <a:fld id="{CBD5BDE3-FA6D-4164-BC33-C23781A6C8ED}" type="datetime1">
               <a:rPr lang="hr-HR" smtClean="0"/>
-              <a:t>3.7.2023.</a:t>
+              <a:t>5.7.2023.</a:t>
             </a:fld>
             <a:endParaRPr lang="hr-HR"/>
           </a:p>
@@ -2549,7 +2724,7 @@
           <a:p>
             <a:fld id="{DFD043E5-98DB-45CA-B0FE-489768F0BE00}" type="datetime1">
               <a:rPr lang="hr-HR" smtClean="0"/>
-              <a:t>3.7.2023.</a:t>
+              <a:t>5.7.2023.</a:t>
             </a:fld>
             <a:endParaRPr lang="hr-HR"/>
           </a:p>
@@ -2708,7 +2883,7 @@
           <a:p>
             <a:fld id="{B96AF0EA-D5EC-42BC-9A9B-B30ACC298175}" type="datetime1">
               <a:rPr lang="hr-HR" smtClean="0"/>
-              <a:t>3.7.2023.</a:t>
+              <a:t>5.7.2023.</a:t>
             </a:fld>
             <a:endParaRPr lang="hr-HR"/>
           </a:p>
@@ -2844,7 +3019,7 @@
           <a:p>
             <a:fld id="{7CB844D9-2224-4AF6-B510-D2B34AAEED69}" type="datetime1">
               <a:rPr lang="hr-HR" smtClean="0"/>
-              <a:t>3.7.2023.</a:t>
+              <a:t>5.7.2023.</a:t>
             </a:fld>
             <a:endParaRPr lang="hr-HR"/>
           </a:p>
@@ -3172,7 +3347,7 @@
           <a:p>
             <a:fld id="{58D0D55C-8349-440B-B556-98656E46A162}" type="datetime1">
               <a:rPr lang="hr-HR" smtClean="0"/>
-              <a:t>3.7.2023.</a:t>
+              <a:t>5.7.2023.</a:t>
             </a:fld>
             <a:endParaRPr lang="hr-HR"/>
           </a:p>
@@ -3487,7 +3662,7 @@
           <a:p>
             <a:fld id="{A7CCABBD-3797-4C2E-A7D8-DA98DA04BB92}" type="datetime1">
               <a:rPr lang="hr-HR" smtClean="0"/>
-              <a:t>3.7.2023.</a:t>
+              <a:t>5.7.2023.</a:t>
             </a:fld>
             <a:endParaRPr lang="hr-HR"/>
           </a:p>
@@ -3739,7 +3914,7 @@
           <a:p>
             <a:fld id="{419F11F9-7281-45ED-B795-9A46AD1413F0}" type="datetime1">
               <a:rPr lang="hr-HR" smtClean="0"/>
-              <a:t>3.7.2023.</a:t>
+              <a:t>5.7.2023.</a:t>
             </a:fld>
             <a:endParaRPr lang="hr-HR"/>
           </a:p>
@@ -5088,11 +5263,18 @@
           <a:lstStyle/>
           <a:p>
             <a:r>
+              <a:rPr lang="en-US" sz="5400" dirty="0" err="1">
+                <a:latin typeface="Arial" panose="020B0604020202020204" pitchFamily="34" charset="0"/>
+                <a:cs typeface="Arial" panose="020B0604020202020204" pitchFamily="34" charset="0"/>
+              </a:rPr>
+              <a:t>Zaklju</a:t>
+            </a:r>
+            <a:r>
               <a:rPr lang="hr-HR" sz="5400" dirty="0">
                 <a:latin typeface="Arial" panose="020B0604020202020204" pitchFamily="34" charset="0"/>
                 <a:cs typeface="Arial" panose="020B0604020202020204" pitchFamily="34" charset="0"/>
               </a:rPr>
-              <a:t>Budući rad</a:t>
+              <a:t>čak</a:t>
             </a:r>
           </a:p>
         </p:txBody>
@@ -5113,10 +5295,15 @@
             <p:ph idx="1"/>
           </p:nvPr>
         </p:nvSpPr>
-        <p:spPr/>
+        <p:spPr>
+          <a:xfrm>
+            <a:off x="1261871" y="1828800"/>
+            <a:ext cx="9638565" cy="4815401"/>
+          </a:xfrm>
+        </p:spPr>
         <p:txBody>
           <a:bodyPr>
-            <a:normAutofit/>
+            <a:normAutofit lnSpcReduction="10000"/>
           </a:bodyPr>
           <a:lstStyle/>
           <a:p>
@@ -5137,17 +5324,33 @@
                 <a:latin typeface="Arial" panose="020B0604020202020204" pitchFamily="34" charset="0"/>
                 <a:cs typeface="Arial" panose="020B0604020202020204" pitchFamily="34" charset="0"/>
               </a:rPr>
-              <a:t>primijeniti metode na kompleksnije arhitekture</a:t>
-            </a:r>
-          </a:p>
-          <a:p>
+              <a:t>algoritam </a:t>
+            </a:r>
+            <a:r>
+              <a:rPr lang="hr-HR" sz="2800" dirty="0" err="1">
+                <a:latin typeface="Arial" panose="020B0604020202020204" pitchFamily="34" charset="0"/>
+                <a:cs typeface="Arial" panose="020B0604020202020204" pitchFamily="34" charset="0"/>
+              </a:rPr>
+              <a:t>FastAdvW</a:t>
+            </a:r>
+            <a:r>
+              <a:rPr lang="hr-HR" sz="2800" i="1" dirty="0">
+                <a:latin typeface="Arial" panose="020B0604020202020204" pitchFamily="34" charset="0"/>
+                <a:cs typeface="Arial" panose="020B0604020202020204" pitchFamily="34" charset="0"/>
+              </a:rPr>
+              <a:t> </a:t>
+            </a:r>
             <a:r>
               <a:rPr lang="hr-HR" sz="2800" dirty="0">
                 <a:latin typeface="Arial" panose="020B0604020202020204" pitchFamily="34" charset="0"/>
                 <a:cs typeface="Arial" panose="020B0604020202020204" pitchFamily="34" charset="0"/>
               </a:rPr>
-              <a:t>mogućnost kombiniranja „besplatnog” i brzog učenja</a:t>
-            </a:r>
+              <a:t>pruža točnost i robusnost podjednaku algoritmu PGD, ali uz skoro dvostruko kraće vrijeme učenja</a:t>
+            </a:r>
+            <a:endParaRPr lang="hr-HR" sz="2800" i="1" dirty="0">
+              <a:latin typeface="Arial" panose="020B0604020202020204" pitchFamily="34" charset="0"/>
+              <a:cs typeface="Arial" panose="020B0604020202020204" pitchFamily="34" charset="0"/>
+            </a:endParaRPr>
           </a:p>
           <a:p>
             <a:pPr marL="0" indent="0">
@@ -5167,7 +5370,7 @@
                 <a:latin typeface="Arial" panose="020B0604020202020204" pitchFamily="34" charset="0"/>
                 <a:cs typeface="Arial" panose="020B0604020202020204" pitchFamily="34" charset="0"/>
               </a:rPr>
-              <a:t>proučiti utjecaj korištenja L1 norme</a:t>
+              <a:t>mogućnost korištenja mjerenja točnosti na skupu za učenje po mini-grupama kao detektora postojanja zatrovanih podataka</a:t>
             </a:r>
           </a:p>
           <a:p>
@@ -5176,7 +5379,7 @@
                 <a:latin typeface="Arial" panose="020B0604020202020204" pitchFamily="34" charset="0"/>
                 <a:cs typeface="Arial" panose="020B0604020202020204" pitchFamily="34" charset="0"/>
               </a:rPr>
-              <a:t>mjeriti uspješnost detekcije zatrovanih podataka praćenjem promjena predviđanja</a:t>
+              <a:t>alternativno, mogućnost korištenja praćenja promjena predviđanja modela</a:t>
             </a:r>
           </a:p>
         </p:txBody>
@@ -5247,6 +5450,184 @@
           <p:cNvPr id="2" name="Title 1">
             <a:extLst>
               <a:ext uri="{FF2B5EF4-FFF2-40B4-BE49-F238E27FC236}">
+                <a16:creationId xmlns:a16="http://schemas.microsoft.com/office/drawing/2014/main" id="{794FE518-BF5D-2ABC-255D-9818FC837A39}"/>
+              </a:ext>
+            </a:extLst>
+          </p:cNvPr>
+          <p:cNvSpPr>
+            <a:spLocks noGrp="1"/>
+          </p:cNvSpPr>
+          <p:nvPr>
+            <p:ph type="title"/>
+          </p:nvPr>
+        </p:nvSpPr>
+        <p:spPr/>
+        <p:txBody>
+          <a:bodyPr>
+            <a:normAutofit/>
+          </a:bodyPr>
+          <a:lstStyle/>
+          <a:p>
+            <a:r>
+              <a:rPr lang="hr-HR" sz="5400" dirty="0">
+                <a:latin typeface="Arial" panose="020B0604020202020204" pitchFamily="34" charset="0"/>
+                <a:cs typeface="Arial" panose="020B0604020202020204" pitchFamily="34" charset="0"/>
+              </a:rPr>
+              <a:t>Budući rad</a:t>
+            </a:r>
+          </a:p>
+        </p:txBody>
+      </p:sp>
+      <p:sp>
+        <p:nvSpPr>
+          <p:cNvPr id="3" name="Content Placeholder 2">
+            <a:extLst>
+              <a:ext uri="{FF2B5EF4-FFF2-40B4-BE49-F238E27FC236}">
+                <a16:creationId xmlns:a16="http://schemas.microsoft.com/office/drawing/2014/main" id="{C52C608F-A7F0-C9DD-FE0A-7411086D0F8C}"/>
+              </a:ext>
+            </a:extLst>
+          </p:cNvPr>
+          <p:cNvSpPr>
+            <a:spLocks noGrp="1"/>
+          </p:cNvSpPr>
+          <p:nvPr>
+            <p:ph idx="1"/>
+          </p:nvPr>
+        </p:nvSpPr>
+        <p:spPr/>
+        <p:txBody>
+          <a:bodyPr>
+            <a:normAutofit/>
+          </a:bodyPr>
+          <a:lstStyle/>
+          <a:p>
+            <a:pPr marL="0" indent="0">
+              <a:buNone/>
+            </a:pPr>
+            <a:r>
+              <a:rPr lang="hr-HR" sz="2800" dirty="0">
+                <a:latin typeface="Arial" panose="020B0604020202020204" pitchFamily="34" charset="0"/>
+                <a:cs typeface="Arial" panose="020B0604020202020204" pitchFamily="34" charset="0"/>
+              </a:rPr>
+              <a:t>Algoritmi za brzo robusno učenje</a:t>
+            </a:r>
+          </a:p>
+          <a:p>
+            <a:r>
+              <a:rPr lang="hr-HR" sz="2800" dirty="0">
+                <a:latin typeface="Arial" panose="020B0604020202020204" pitchFamily="34" charset="0"/>
+                <a:cs typeface="Arial" panose="020B0604020202020204" pitchFamily="34" charset="0"/>
+              </a:rPr>
+              <a:t>primijeniti metode na kompleksnije arhitekture</a:t>
+            </a:r>
+          </a:p>
+          <a:p>
+            <a:r>
+              <a:rPr lang="hr-HR" sz="2800" dirty="0">
+                <a:latin typeface="Arial" panose="020B0604020202020204" pitchFamily="34" charset="0"/>
+                <a:cs typeface="Arial" panose="020B0604020202020204" pitchFamily="34" charset="0"/>
+              </a:rPr>
+              <a:t>mogućnost kombiniranja „besplatnog” i brzog učenja</a:t>
+            </a:r>
+          </a:p>
+          <a:p>
+            <a:pPr marL="0" indent="0">
+              <a:buNone/>
+            </a:pPr>
+            <a:r>
+              <a:rPr lang="hr-HR" sz="2800" dirty="0">
+                <a:latin typeface="Arial" panose="020B0604020202020204" pitchFamily="34" charset="0"/>
+                <a:cs typeface="Arial" panose="020B0604020202020204" pitchFamily="34" charset="0"/>
+              </a:rPr>
+              <a:t>Detekcija zatrovanih podataka</a:t>
+            </a:r>
+          </a:p>
+          <a:p>
+            <a:r>
+              <a:rPr lang="hr-HR" sz="2800" dirty="0">
+                <a:latin typeface="Arial" panose="020B0604020202020204" pitchFamily="34" charset="0"/>
+                <a:cs typeface="Arial" panose="020B0604020202020204" pitchFamily="34" charset="0"/>
+              </a:rPr>
+              <a:t>proučiti utjecaj korištenja L1 norme</a:t>
+            </a:r>
+          </a:p>
+          <a:p>
+            <a:r>
+              <a:rPr lang="hr-HR" sz="2800" dirty="0">
+                <a:latin typeface="Arial" panose="020B0604020202020204" pitchFamily="34" charset="0"/>
+                <a:cs typeface="Arial" panose="020B0604020202020204" pitchFamily="34" charset="0"/>
+              </a:rPr>
+              <a:t>mjeriti uspješnost detekcije zatrovanih podataka praćenjem promjena predviđanja</a:t>
+            </a:r>
+          </a:p>
+        </p:txBody>
+      </p:sp>
+      <p:sp>
+        <p:nvSpPr>
+          <p:cNvPr id="4" name="Slide Number Placeholder 3">
+            <a:extLst>
+              <a:ext uri="{FF2B5EF4-FFF2-40B4-BE49-F238E27FC236}">
+                <a16:creationId xmlns:a16="http://schemas.microsoft.com/office/drawing/2014/main" id="{837C1893-2DB1-FC1C-507B-1DD228B519F2}"/>
+              </a:ext>
+            </a:extLst>
+          </p:cNvPr>
+          <p:cNvSpPr>
+            <a:spLocks noGrp="1"/>
+          </p:cNvSpPr>
+          <p:nvPr>
+            <p:ph type="sldNum" sz="quarter" idx="12"/>
+          </p:nvPr>
+        </p:nvSpPr>
+        <p:spPr/>
+        <p:txBody>
+          <a:bodyPr>
+            <a:normAutofit lnSpcReduction="10000"/>
+          </a:bodyPr>
+          <a:lstStyle/>
+          <a:p>
+            <a:fld id="{019053DD-E1D2-4EE1-AE49-51105943DBFA}" type="slidenum">
+              <a:rPr lang="hr-HR" smtClean="0"/>
+              <a:t>15</a:t>
+            </a:fld>
+            <a:endParaRPr lang="hr-HR"/>
+          </a:p>
+        </p:txBody>
+      </p:sp>
+    </p:spTree>
+    <p:extLst>
+      <p:ext uri="{BB962C8B-B14F-4D97-AF65-F5344CB8AC3E}">
+        <p14:creationId xmlns:p14="http://schemas.microsoft.com/office/powerpoint/2010/main" val="2726378578"/>
+      </p:ext>
+    </p:extLst>
+  </p:cSld>
+  <p:clrMapOvr>
+    <a:masterClrMapping/>
+  </p:clrMapOvr>
+</p:sld>
+</file>
+
+<file path=ppt/slides/slide17.xml><?xml version="1.0" encoding="utf-8"?>
+<p:sld xmlns:a="http://schemas.openxmlformats.org/drawingml/2006/main" xmlns:r="http://schemas.openxmlformats.org/officeDocument/2006/relationships" xmlns:p="http://schemas.openxmlformats.org/presentationml/2006/main">
+  <p:cSld>
+    <p:spTree>
+      <p:nvGrpSpPr>
+        <p:cNvPr id="1" name=""/>
+        <p:cNvGrpSpPr/>
+        <p:nvPr/>
+      </p:nvGrpSpPr>
+      <p:grpSpPr>
+        <a:xfrm>
+          <a:off x="0" y="0"/>
+          <a:ext cx="0" cy="0"/>
+          <a:chOff x="0" y="0"/>
+          <a:chExt cx="0" cy="0"/>
+        </a:xfrm>
+      </p:grpSpPr>
+      <p:sp>
+        <p:nvSpPr>
+          <p:cNvPr id="2" name="Title 1">
+            <a:extLst>
+              <a:ext uri="{FF2B5EF4-FFF2-40B4-BE49-F238E27FC236}">
                 <a16:creationId xmlns:a16="http://schemas.microsoft.com/office/drawing/2014/main" id="{015F66F4-4AF2-9F1E-BE4D-F6222070025E}"/>
               </a:ext>
             </a:extLst>
@@ -5420,12 +5801,37 @@
               <a:buAutoNum type="arabicPeriod"/>
             </a:pPr>
             <a:r>
+              <a:rPr lang="en-US" sz="2800" dirty="0" err="1">
+                <a:latin typeface="Arial" panose="020B0604020202020204" pitchFamily="34" charset="0"/>
+                <a:cs typeface="Arial" panose="020B0604020202020204" pitchFamily="34" charset="0"/>
+              </a:rPr>
+              <a:t>Zaklju</a:t>
+            </a:r>
+            <a:r>
+              <a:rPr lang="hr-HR" sz="2800" dirty="0">
+                <a:latin typeface="Arial" panose="020B0604020202020204" pitchFamily="34" charset="0"/>
+                <a:cs typeface="Arial" panose="020B0604020202020204" pitchFamily="34" charset="0"/>
+              </a:rPr>
+              <a:t>čak</a:t>
+            </a:r>
+          </a:p>
+          <a:p>
+            <a:pPr marL="514350" indent="-514350">
+              <a:buSzPct val="100000"/>
+              <a:buFont typeface="+mj-lt"/>
+              <a:buAutoNum type="arabicPeriod"/>
+            </a:pPr>
+            <a:r>
               <a:rPr lang="hr-HR" sz="2800" dirty="0">
                 <a:latin typeface="Arial" panose="020B0604020202020204" pitchFamily="34" charset="0"/>
                 <a:cs typeface="Arial" panose="020B0604020202020204" pitchFamily="34" charset="0"/>
               </a:rPr>
               <a:t>Budući rad</a:t>
             </a:r>
+            <a:endParaRPr lang="en-US" sz="2800" dirty="0">
+              <a:latin typeface="Arial" panose="020B0604020202020204" pitchFamily="34" charset="0"/>
+              <a:cs typeface="Arial" panose="020B0604020202020204" pitchFamily="34" charset="0"/>
+            </a:endParaRPr>
           </a:p>
           <a:p>
             <a:pPr marL="514350" indent="-514350">
@@ -5773,7 +6179,7 @@
                 <a:latin typeface="Arial" panose="020B0604020202020204" pitchFamily="34" charset="0"/>
                 <a:cs typeface="Arial" panose="020B0604020202020204" pitchFamily="34" charset="0"/>
               </a:rPr>
-              <a:t>„besplatno” učenje</a:t>
+              <a:t>„besplatno” učenje PGD-om</a:t>
             </a:r>
           </a:p>
           <a:p>
@@ -5782,7 +6188,7 @@
                 <a:latin typeface="Arial" panose="020B0604020202020204" pitchFamily="34" charset="0"/>
                 <a:cs typeface="Arial" panose="020B0604020202020204" pitchFamily="34" charset="0"/>
               </a:rPr>
-              <a:t>brzo učenje</a:t>
+              <a:t>brzo učenje pažljivo inicijaliziranim FGSM-om</a:t>
             </a:r>
           </a:p>
           <a:p>
@@ -5791,7 +6197,7 @@
                 <a:latin typeface="Arial" panose="020B0604020202020204" pitchFamily="34" charset="0"/>
                 <a:cs typeface="Arial" panose="020B0604020202020204" pitchFamily="34" charset="0"/>
               </a:rPr>
-              <a:t>nadogradnje brzog učenja</a:t>
+              <a:t>kombinirano robusno učenje</a:t>
             </a:r>
           </a:p>
         </p:txBody>
@@ -6478,10 +6884,10 @@
       </p:sp>
       <p:pic>
         <p:nvPicPr>
-          <p:cNvPr id="8" name="Content Placeholder 7" descr="A picture containing text, screenshot, design&#10;&#10;Description automatically generated">
+          <p:cNvPr id="14" name="Content Placeholder 13" descr="A collage of images of animals&#10;&#10;Description automatically generated">
             <a:extLst>
               <a:ext uri="{FF2B5EF4-FFF2-40B4-BE49-F238E27FC236}">
-                <a16:creationId xmlns:a16="http://schemas.microsoft.com/office/drawing/2014/main" id="{5D4F0AA5-370C-D7CE-7159-733EB6A2B632}"/>
+                <a16:creationId xmlns:a16="http://schemas.microsoft.com/office/drawing/2014/main" id="{CF1CD59E-A0ED-7DD2-3296-828C74F40440}"/>
               </a:ext>
             </a:extLst>
           </p:cNvPr>
@@ -6492,7 +6898,7 @@
             <p:ph idx="1"/>
           </p:nvPr>
         </p:nvPicPr>
-        <p:blipFill>
+        <p:blipFill rotWithShape="1">
           <a:blip r:embed="rId2">
             <a:extLst>
               <a:ext uri="{28A0092B-C50C-407E-A947-70E740481C1C}">
@@ -6500,15 +6906,49 @@
               </a:ext>
             </a:extLst>
           </a:blip>
-          <a:stretch>
-            <a:fillRect/>
-          </a:stretch>
+          <a:srcRect b="51348"/>
+          <a:stretch/>
         </p:blipFill>
         <p:spPr>
           <a:xfrm>
-            <a:off x="1822861" y="1240109"/>
-            <a:ext cx="8325189" cy="5525816"/>
+            <a:off x="467068" y="1300413"/>
+            <a:ext cx="10825772" cy="2633481"/>
           </a:xfrm>
+        </p:spPr>
+      </p:pic>
+      <p:pic>
+        <p:nvPicPr>
+          <p:cNvPr id="17" name="Content Placeholder 13" descr="A collage of images of animals&#10;&#10;Description automatically generated">
+            <a:extLst>
+              <a:ext uri="{FF2B5EF4-FFF2-40B4-BE49-F238E27FC236}">
+                <a16:creationId xmlns:a16="http://schemas.microsoft.com/office/drawing/2014/main" id="{10838F70-707F-8DFF-C5D7-355AB068048C}"/>
+              </a:ext>
+            </a:extLst>
+          </p:cNvPr>
+          <p:cNvPicPr>
+            <a:picLocks noChangeAspect="1"/>
+          </p:cNvPicPr>
+          <p:nvPr/>
+        </p:nvPicPr>
+        <p:blipFill rotWithShape="1">
+          <a:blip r:embed="rId2">
+            <a:extLst>
+              <a:ext uri="{28A0092B-C50C-407E-A947-70E740481C1C}">
+                <a14:useLocalDpi xmlns:a14="http://schemas.microsoft.com/office/drawing/2010/main" val="0"/>
+              </a:ext>
+            </a:extLst>
+          </a:blip>
+          <a:srcRect t="48652" r="24163"/>
+          <a:stretch/>
+        </p:blipFill>
+        <p:spPr>
+          <a:xfrm>
+            <a:off x="1775022" y="3933894"/>
+            <a:ext cx="8209864" cy="2779404"/>
+          </a:xfrm>
+          <a:prstGeom prst="rect">
+            <a:avLst/>
+          </a:prstGeom>
         </p:spPr>
       </p:pic>
     </p:spTree>

</xml_diff>